<commit_message>
Commits for End of Week
Updated SDPi Requirement Types model to better align with SysML 2.0 language.
Added content to TF-1 Appendix A in support of RI+MC discussion
More #TODO: normalization.
</commit_message>
<xml_diff>
--- a/SDPi_Supplement/sources/vol1-diagram-sdpi-req-types-model.pptx
+++ b/SDPi_Supplement/sources/vol1-diagram-sdpi-req-types-model.pptx
@@ -197,7 +197,7 @@
           <a:p>
             <a:fld id="{8D25072E-162D-46ED-A5CB-0F20C9B31254}" type="datetimeFigureOut">
               <a:rPr lang="en-US" smtClean="0"/>
-              <a:t>11/2/2022</a:t>
+              <a:t>11/3/2022</a:t>
             </a:fld>
             <a:endParaRPr lang="en-US"/>
           </a:p>
@@ -616,7 +616,7 @@
           <a:p>
             <a:fld id="{2EEC94F7-949D-476A-A216-B4C0495AF0A9}" type="datetime1">
               <a:rPr lang="en-US" smtClean="0"/>
-              <a:t>11/2/2022</a:t>
+              <a:t>11/3/2022</a:t>
             </a:fld>
             <a:endParaRPr lang="en-US" dirty="0"/>
           </a:p>
@@ -1197,7 +1197,7 @@
           <a:p>
             <a:fld id="{32177C7B-DB6C-4979-B431-8A70B6AA02C0}" type="datetime1">
               <a:rPr lang="en-US" smtClean="0"/>
-              <a:t>11/2/2022</a:t>
+              <a:t>11/3/2022</a:t>
             </a:fld>
             <a:endParaRPr lang="en-US"/>
           </a:p>
@@ -1470,7 +1470,7 @@
           <a:p>
             <a:fld id="{6988B30D-439E-4AB2-AA68-B23618995FD5}" type="datetime1">
               <a:rPr lang="en-US" smtClean="0"/>
-              <a:t>11/2/2022</a:t>
+              <a:t>11/3/2022</a:t>
             </a:fld>
             <a:endParaRPr lang="en-US"/>
           </a:p>
@@ -1890,7 +1890,7 @@
           <a:p>
             <a:fld id="{DCD80575-BBBA-48FF-AA29-1886450D5040}" type="datetime1">
               <a:rPr lang="en-US" smtClean="0"/>
-              <a:t>11/2/2022</a:t>
+              <a:t>11/3/2022</a:t>
             </a:fld>
             <a:endParaRPr lang="en-US"/>
           </a:p>
@@ -2044,7 +2044,7 @@
           <a:p>
             <a:fld id="{BC5FA200-2376-48FE-AF10-E289A555E233}" type="datetime1">
               <a:rPr lang="en-US" smtClean="0"/>
-              <a:t>11/2/2022</a:t>
+              <a:t>11/3/2022</a:t>
             </a:fld>
             <a:endParaRPr lang="en-US"/>
           </a:p>
@@ -2206,7 +2206,7 @@
           <a:p>
             <a:fld id="{5413C7E2-5F5A-44A4-9515-26CB28336B65}" type="datetime1">
               <a:rPr lang="en-US" smtClean="0"/>
-              <a:t>11/2/2022</a:t>
+              <a:t>11/3/2022</a:t>
             </a:fld>
             <a:endParaRPr lang="en-US" dirty="0"/>
           </a:p>
@@ -2455,7 +2455,7 @@
           <a:p>
             <a:fld id="{C2466822-F1C2-4EED-8632-36F6A3080457}" type="datetime1">
               <a:rPr lang="en-US" smtClean="0"/>
-              <a:t>11/2/2022</a:t>
+              <a:t>11/3/2022</a:t>
             </a:fld>
             <a:endParaRPr lang="en-US"/>
           </a:p>
@@ -2886,7 +2886,7 @@
         </p:nvSpPr>
         <p:spPr>
           <a:xfrm>
-            <a:off x="2432320" y="3286508"/>
+            <a:off x="2432320" y="3449346"/>
             <a:ext cx="470041" cy="276999"/>
           </a:xfrm>
           <a:prstGeom prst="rect">
@@ -2923,7 +2923,7 @@
         <p:spPr>
           <a:xfrm>
             <a:off x="4963703" y="2525208"/>
-            <a:ext cx="1935386" cy="369332"/>
+            <a:ext cx="1935386" cy="646331"/>
           </a:xfrm>
           <a:prstGeom prst="rect">
             <a:avLst/>
@@ -2944,7 +2944,7 @@
             <a:pPr algn="ctr"/>
             <a:r>
               <a:rPr lang="en-US" i="1" dirty="0"/>
-              <a:t>SDPi Requirement</a:t>
+              <a:t>Requirement Definition</a:t>
             </a:r>
           </a:p>
         </p:txBody>
@@ -2998,7 +2998,7 @@
         </p:nvGrpSpPr>
         <p:grpSpPr>
           <a:xfrm>
-            <a:off x="1624571" y="3517341"/>
+            <a:off x="1624571" y="3680179"/>
             <a:ext cx="8619293" cy="377136"/>
             <a:chOff x="2354487" y="5467841"/>
             <a:chExt cx="8619293" cy="377136"/>
@@ -3187,8 +3187,8 @@
         </p:nvCxnSpPr>
         <p:spPr>
           <a:xfrm rot="5400000">
-            <a:off x="3920145" y="1506089"/>
-            <a:ext cx="622801" cy="3399702"/>
+            <a:off x="3977225" y="1726008"/>
+            <a:ext cx="508640" cy="3399702"/>
           </a:xfrm>
           <a:prstGeom prst="bentConnector3">
             <a:avLst>
@@ -3236,8 +3236,8 @@
         </p:nvCxnSpPr>
         <p:spPr>
           <a:xfrm rot="5400000">
-            <a:off x="5050418" y="2644166"/>
-            <a:ext cx="630605" cy="1131353"/>
+            <a:off x="5107498" y="2864085"/>
+            <a:ext cx="516444" cy="1131353"/>
           </a:xfrm>
           <a:prstGeom prst="bentConnector3">
             <a:avLst>
@@ -3285,8 +3285,8 @@
         </p:nvCxnSpPr>
         <p:spPr>
           <a:xfrm rot="16200000" flipH="1">
-            <a:off x="6185262" y="2640674"/>
-            <a:ext cx="629264" cy="1136996"/>
+            <a:off x="6242343" y="2860592"/>
+            <a:ext cx="515103" cy="1136996"/>
           </a:xfrm>
           <a:prstGeom prst="bentConnector3">
             <a:avLst>
@@ -3334,8 +3334,8 @@
         </p:nvCxnSpPr>
         <p:spPr>
           <a:xfrm rot="16200000" flipH="1">
-            <a:off x="7319436" y="1506499"/>
-            <a:ext cx="629264" cy="3405345"/>
+            <a:off x="7376517" y="1726417"/>
+            <a:ext cx="515103" cy="3405345"/>
           </a:xfrm>
           <a:prstGeom prst="bentConnector3">
             <a:avLst>
@@ -3379,7 +3379,7 @@
         </p:nvSpPr>
         <p:spPr>
           <a:xfrm>
-            <a:off x="5891799" y="2942053"/>
+            <a:off x="5883608" y="3192178"/>
             <a:ext cx="688504" cy="276999"/>
           </a:xfrm>
           <a:prstGeom prst="rect">
@@ -3415,7 +3415,7 @@
         </p:nvSpPr>
         <p:spPr>
           <a:xfrm>
-            <a:off x="4738551" y="3292823"/>
+            <a:off x="4738551" y="3455661"/>
             <a:ext cx="470041" cy="276999"/>
           </a:xfrm>
           <a:prstGeom prst="rect">
@@ -3451,7 +3451,7 @@
         </p:nvSpPr>
         <p:spPr>
           <a:xfrm>
-            <a:off x="7006900" y="3285380"/>
+            <a:off x="7006900" y="3448218"/>
             <a:ext cx="470041" cy="276999"/>
           </a:xfrm>
           <a:prstGeom prst="rect">
@@ -3487,7 +3487,7 @@
         </p:nvSpPr>
         <p:spPr>
           <a:xfrm>
-            <a:off x="9299194" y="3292823"/>
+            <a:off x="9299194" y="3455661"/>
             <a:ext cx="470041" cy="276999"/>
           </a:xfrm>
           <a:prstGeom prst="rect">
@@ -3524,7 +3524,7 @@
         <p:spPr>
           <a:xfrm>
             <a:off x="8226823" y="2514718"/>
-            <a:ext cx="1935386" cy="369332"/>
+            <a:ext cx="1935386" cy="646331"/>
           </a:xfrm>
           <a:prstGeom prst="rect">
             <a:avLst/>
@@ -3545,7 +3545,7 @@
             <a:pPr algn="ctr"/>
             <a:r>
               <a:rPr lang="en-US" dirty="0"/>
-              <a:t>Usage</a:t>
+              <a:t>Requirement Usage</a:t>
             </a:r>
           </a:p>
         </p:txBody>
@@ -3568,7 +3568,7 @@
         </p:nvCxnSpPr>
         <p:spPr>
           <a:xfrm flipH="1">
-            <a:off x="6899089" y="2699384"/>
+            <a:off x="6899089" y="2837884"/>
             <a:ext cx="1327734" cy="10490"/>
           </a:xfrm>
           <a:prstGeom prst="straightConnector1">
@@ -3611,7 +3611,7 @@
         </p:nvSpPr>
         <p:spPr>
           <a:xfrm>
-            <a:off x="6827727" y="2689947"/>
+            <a:off x="6827727" y="2577213"/>
             <a:ext cx="470041" cy="276999"/>
           </a:xfrm>
           <a:prstGeom prst="rect">
@@ -3647,7 +3647,7 @@
         </p:nvSpPr>
         <p:spPr>
           <a:xfrm>
-            <a:off x="7845687" y="2689946"/>
+            <a:off x="7845687" y="2852784"/>
             <a:ext cx="470041" cy="276999"/>
           </a:xfrm>
           <a:prstGeom prst="rect">
@@ -3724,12 +3724,12 @@
         <p:spPr>
           <a:xfrm rot="10800000" flipH="1">
             <a:off x="4963702" y="2525208"/>
-            <a:ext cx="967693" cy="184666"/>
+            <a:ext cx="967693" cy="323166"/>
           </a:xfrm>
           <a:prstGeom prst="bentConnector4">
             <a:avLst>
               <a:gd name="adj1" fmla="val -23623"/>
-              <a:gd name="adj2" fmla="val 223791"/>
+              <a:gd name="adj2" fmla="val 170738"/>
             </a:avLst>
           </a:prstGeom>
           <a:ln w="15875">

</xml_diff>